<commit_message>
feat: algorithm slide deck
</commit_message>
<xml_diff>
--- a/presentation.pptx
+++ b/presentation.pptx
@@ -5,10 +5,10 @@
     <p:sldMasterId id="2147483660" r:id="rId4"/>
   </p:sldMasterIdLst>
   <p:notesMasterIdLst>
-    <p:notesMasterId r:id="rId26"/>
+    <p:notesMasterId r:id="rId29"/>
   </p:notesMasterIdLst>
   <p:handoutMasterIdLst>
-    <p:handoutMasterId r:id="rId27"/>
+    <p:handoutMasterId r:id="rId30"/>
   </p:handoutMasterIdLst>
   <p:sldIdLst>
     <p:sldId id="257" r:id="rId5"/>
@@ -24,14 +24,17 @@
     <p:sldId id="273" r:id="rId15"/>
     <p:sldId id="274" r:id="rId16"/>
     <p:sldId id="275" r:id="rId17"/>
-    <p:sldId id="269" r:id="rId18"/>
-    <p:sldId id="277" r:id="rId19"/>
-    <p:sldId id="278" r:id="rId20"/>
-    <p:sldId id="279" r:id="rId21"/>
-    <p:sldId id="282" r:id="rId22"/>
-    <p:sldId id="283" r:id="rId23"/>
-    <p:sldId id="284" r:id="rId24"/>
-    <p:sldId id="285" r:id="rId25"/>
+    <p:sldId id="286" r:id="rId18"/>
+    <p:sldId id="287" r:id="rId19"/>
+    <p:sldId id="288" r:id="rId20"/>
+    <p:sldId id="269" r:id="rId21"/>
+    <p:sldId id="277" r:id="rId22"/>
+    <p:sldId id="278" r:id="rId23"/>
+    <p:sldId id="279" r:id="rId24"/>
+    <p:sldId id="282" r:id="rId25"/>
+    <p:sldId id="283" r:id="rId26"/>
+    <p:sldId id="284" r:id="rId27"/>
+    <p:sldId id="285" r:id="rId28"/>
   </p:sldIdLst>
   <p:sldSz cx="12188825" cy="6858000"/>
   <p:notesSz cx="6858000" cy="9144000"/>
@@ -15211,7 +15214,7 @@
                 <a:latin typeface="Cascadia Code" panose="020B0609020000020004" pitchFamily="49" charset="0"/>
                 <a:cs typeface="Cascadia Code" panose="020B0609020000020004" pitchFamily="49" charset="0"/>
               </a:rPr>
-              <a:t> leverage previously learned texture-based features from known skin regions (face mask) to estimate the likelihood that other </a:t>
+              <a:t> Leverage previously learned texture-based features from known skin regions (face mask) to estimate the likelihood that other </a:t>
             </a:r>
             <a:r>
               <a:rPr lang="en-US" sz="1600" dirty="0" err="1">
@@ -16482,6 +16485,1445 @@
 </file>
 
 <file path=ppt/slides/slide14.xml><?xml version="1.0" encoding="utf-8"?>
+<p:sld xmlns:a="http://schemas.openxmlformats.org/drawingml/2006/main" xmlns:r="http://schemas.openxmlformats.org/officeDocument/2006/relationships" xmlns:p="http://schemas.openxmlformats.org/presentationml/2006/main">
+  <p:cSld>
+    <p:spTree>
+      <p:nvGrpSpPr>
+        <p:cNvPr id="1" name="">
+          <a:extLst>
+            <a:ext uri="{FF2B5EF4-FFF2-40B4-BE49-F238E27FC236}">
+              <a16:creationId xmlns:a16="http://schemas.microsoft.com/office/drawing/2014/main" id="{FD6E401D-D841-D0BB-8C97-66F085F70E0C}"/>
+            </a:ext>
+          </a:extLst>
+        </p:cNvPr>
+        <p:cNvGrpSpPr/>
+        <p:nvPr/>
+      </p:nvGrpSpPr>
+      <p:grpSpPr>
+        <a:xfrm>
+          <a:off x="0" y="0"/>
+          <a:ext cx="0" cy="0"/>
+          <a:chOff x="0" y="0"/>
+          <a:chExt cx="0" cy="0"/>
+        </a:xfrm>
+      </p:grpSpPr>
+      <p:sp>
+        <p:nvSpPr>
+          <p:cNvPr id="2" name="Title 1">
+            <a:extLst>
+              <a:ext uri="{FF2B5EF4-FFF2-40B4-BE49-F238E27FC236}">
+                <a16:creationId xmlns:a16="http://schemas.microsoft.com/office/drawing/2014/main" id="{57A95D36-E4D9-C3CE-98DD-655C4FDC23C5}"/>
+              </a:ext>
+            </a:extLst>
+          </p:cNvPr>
+          <p:cNvSpPr>
+            <a:spLocks noGrp="1"/>
+          </p:cNvSpPr>
+          <p:nvPr>
+            <p:ph type="title"/>
+          </p:nvPr>
+        </p:nvSpPr>
+        <p:spPr>
+          <a:xfrm>
+            <a:off x="1293812" y="634181"/>
+            <a:ext cx="8611470" cy="1447800"/>
+          </a:xfrm>
+        </p:spPr>
+        <p:txBody>
+          <a:bodyPr/>
+          <a:lstStyle/>
+          <a:p>
+            <a:r>
+              <a:rPr lang="en-IN" dirty="0">
+                <a:solidFill>
+                  <a:schemeClr val="bg2">
+                    <a:lumMod val="25000"/>
+                  </a:schemeClr>
+                </a:solidFill>
+                <a:latin typeface="Cascadia Code" panose="020B0609020000020004" pitchFamily="49" charset="0"/>
+                <a:cs typeface="Cascadia Code" panose="020B0609020000020004" pitchFamily="49" charset="0"/>
+              </a:rPr>
+              <a:t>Region Growing Algorithm</a:t>
+            </a:r>
+          </a:p>
+        </p:txBody>
+      </p:sp>
+      <p:sp>
+        <p:nvSpPr>
+          <p:cNvPr id="3" name="Slide Number Placeholder 2">
+            <a:extLst>
+              <a:ext uri="{FF2B5EF4-FFF2-40B4-BE49-F238E27FC236}">
+                <a16:creationId xmlns:a16="http://schemas.microsoft.com/office/drawing/2014/main" id="{2EFA2485-B938-049B-44F7-BDAC6A2B9E07}"/>
+              </a:ext>
+            </a:extLst>
+          </p:cNvPr>
+          <p:cNvSpPr>
+            <a:spLocks noGrp="1"/>
+          </p:cNvSpPr>
+          <p:nvPr>
+            <p:ph type="sldNum" sz="quarter" idx="12"/>
+          </p:nvPr>
+        </p:nvSpPr>
+        <p:spPr/>
+        <p:txBody>
+          <a:bodyPr/>
+          <a:lstStyle/>
+          <a:p>
+            <a:r>
+              <a:rPr lang="en-US" dirty="0">
+                <a:solidFill>
+                  <a:schemeClr val="bg2">
+                    <a:lumMod val="25000"/>
+                  </a:schemeClr>
+                </a:solidFill>
+                <a:latin typeface="Cascadia Code" panose="020B0609020000020004" pitchFamily="49" charset="0"/>
+                <a:cs typeface="Cascadia Code" panose="020B0609020000020004" pitchFamily="49" charset="0"/>
+              </a:rPr>
+              <a:t>7</a:t>
+            </a:r>
+          </a:p>
+        </p:txBody>
+      </p:sp>
+      <p:sp>
+        <p:nvSpPr>
+          <p:cNvPr id="4" name="Content Placeholder 3">
+            <a:extLst>
+              <a:ext uri="{FF2B5EF4-FFF2-40B4-BE49-F238E27FC236}">
+                <a16:creationId xmlns:a16="http://schemas.microsoft.com/office/drawing/2014/main" id="{E4951FEC-1DDE-704E-F41F-483B95C4E0F1}"/>
+              </a:ext>
+            </a:extLst>
+          </p:cNvPr>
+          <p:cNvSpPr>
+            <a:spLocks noGrp="1"/>
+          </p:cNvSpPr>
+          <p:nvPr>
+            <p:ph idx="1"/>
+          </p:nvPr>
+        </p:nvSpPr>
+        <p:spPr>
+          <a:xfrm>
+            <a:off x="1293812" y="1358081"/>
+            <a:ext cx="10209930" cy="4724400"/>
+          </a:xfrm>
+        </p:spPr>
+        <p:txBody>
+          <a:bodyPr>
+            <a:noAutofit/>
+          </a:bodyPr>
+          <a:lstStyle/>
+          <a:p>
+            <a:r>
+              <a:rPr lang="en-US" sz="1600" b="1" dirty="0">
+                <a:solidFill>
+                  <a:schemeClr val="bg2">
+                    <a:lumMod val="25000"/>
+                  </a:schemeClr>
+                </a:solidFill>
+                <a:latin typeface="Cascadia Code" panose="020B0609020000020004" pitchFamily="49" charset="0"/>
+                <a:cs typeface="Cascadia Code" panose="020B0609020000020004" pitchFamily="49" charset="0"/>
+              </a:rPr>
+              <a:t>Goal:</a:t>
+            </a:r>
+            <a:r>
+              <a:rPr lang="en-US" sz="1600" dirty="0">
+                <a:solidFill>
+                  <a:schemeClr val="bg2">
+                    <a:lumMod val="25000"/>
+                  </a:schemeClr>
+                </a:solidFill>
+                <a:latin typeface="Cascadia Code" panose="020B0609020000020004" pitchFamily="49" charset="0"/>
+                <a:cs typeface="Cascadia Code" panose="020B0609020000020004" pitchFamily="49" charset="0"/>
+              </a:rPr>
+              <a:t> Use estimates gathered so far to detect skin pixels outside of the face.</a:t>
+            </a:r>
+          </a:p>
+          <a:p>
+            <a:r>
+              <a:rPr lang="en-US" sz="1600" b="1" dirty="0">
+                <a:solidFill>
+                  <a:schemeClr val="bg2">
+                    <a:lumMod val="25000"/>
+                  </a:schemeClr>
+                </a:solidFill>
+                <a:latin typeface="Cascadia Code" panose="020B0609020000020004" pitchFamily="49" charset="0"/>
+                <a:cs typeface="Cascadia Code" panose="020B0609020000020004" pitchFamily="49" charset="0"/>
+              </a:rPr>
+              <a:t>Algorithm:</a:t>
+            </a:r>
+            <a:endParaRPr lang="en-US" sz="1600" dirty="0">
+              <a:solidFill>
+                <a:schemeClr val="bg2">
+                  <a:lumMod val="25000"/>
+                </a:schemeClr>
+              </a:solidFill>
+              <a:latin typeface="Cascadia Code" panose="020B0609020000020004" pitchFamily="49" charset="0"/>
+              <a:cs typeface="Cascadia Code" panose="020B0609020000020004" pitchFamily="49" charset="0"/>
+            </a:endParaRPr>
+          </a:p>
+          <a:p>
+            <a:r>
+              <a:rPr lang="en-US" sz="1600" dirty="0">
+                <a:solidFill>
+                  <a:schemeClr val="bg2">
+                    <a:lumMod val="25000"/>
+                  </a:schemeClr>
+                </a:solidFill>
+                <a:latin typeface="Cascadia Code" panose="020B0609020000020004" pitchFamily="49" charset="0"/>
+                <a:cs typeface="Cascadia Code" panose="020B0609020000020004" pitchFamily="49" charset="0"/>
+              </a:rPr>
+              <a:t>The region growing algorithm is the culmination of this paper. It leverages all the information extracted from all </a:t>
+            </a:r>
+            <a:r>
+              <a:rPr lang="en-US" sz="1600" dirty="0" err="1">
+                <a:solidFill>
+                  <a:schemeClr val="bg2">
+                    <a:lumMod val="25000"/>
+                  </a:schemeClr>
+                </a:solidFill>
+                <a:latin typeface="Cascadia Code" panose="020B0609020000020004" pitchFamily="49" charset="0"/>
+                <a:cs typeface="Cascadia Code" panose="020B0609020000020004" pitchFamily="49" charset="0"/>
+              </a:rPr>
+              <a:t>superpixels</a:t>
+            </a:r>
+            <a:r>
+              <a:rPr lang="en-US" sz="1600" dirty="0">
+                <a:solidFill>
+                  <a:schemeClr val="bg2">
+                    <a:lumMod val="25000"/>
+                  </a:schemeClr>
+                </a:solidFill>
+                <a:latin typeface="Cascadia Code" panose="020B0609020000020004" pitchFamily="49" charset="0"/>
+                <a:cs typeface="Cascadia Code" panose="020B0609020000020004" pitchFamily="49" charset="0"/>
+              </a:rPr>
+              <a:t> and known skin </a:t>
+            </a:r>
+            <a:r>
+              <a:rPr lang="en-US" sz="1600" dirty="0" err="1">
+                <a:solidFill>
+                  <a:schemeClr val="bg2">
+                    <a:lumMod val="25000"/>
+                  </a:schemeClr>
+                </a:solidFill>
+                <a:latin typeface="Cascadia Code" panose="020B0609020000020004" pitchFamily="49" charset="0"/>
+                <a:cs typeface="Cascadia Code" panose="020B0609020000020004" pitchFamily="49" charset="0"/>
+              </a:rPr>
+              <a:t>superpixels</a:t>
+            </a:r>
+            <a:r>
+              <a:rPr lang="en-US" sz="1600" dirty="0">
+                <a:solidFill>
+                  <a:schemeClr val="bg2">
+                    <a:lumMod val="25000"/>
+                  </a:schemeClr>
+                </a:solidFill>
+                <a:latin typeface="Cascadia Code" panose="020B0609020000020004" pitchFamily="49" charset="0"/>
+                <a:cs typeface="Cascadia Code" panose="020B0609020000020004" pitchFamily="49" charset="0"/>
+              </a:rPr>
+              <a:t> to classify skin pixels beyond just the face.</a:t>
+            </a:r>
+          </a:p>
+          <a:p>
+            <a:r>
+              <a:rPr lang="en-US" sz="1600" dirty="0">
+                <a:solidFill>
+                  <a:schemeClr val="bg2">
+                    <a:lumMod val="25000"/>
+                  </a:schemeClr>
+                </a:solidFill>
+                <a:latin typeface="Cascadia Code" panose="020B0609020000020004" pitchFamily="49" charset="0"/>
+                <a:cs typeface="Cascadia Code" panose="020B0609020000020004" pitchFamily="49" charset="0"/>
+              </a:rPr>
+              <a:t>1. The first step is to select seed </a:t>
+            </a:r>
+            <a:r>
+              <a:rPr lang="en-US" sz="1600" dirty="0" err="1">
+                <a:solidFill>
+                  <a:schemeClr val="bg2">
+                    <a:lumMod val="25000"/>
+                  </a:schemeClr>
+                </a:solidFill>
+                <a:latin typeface="Cascadia Code" panose="020B0609020000020004" pitchFamily="49" charset="0"/>
+                <a:cs typeface="Cascadia Code" panose="020B0609020000020004" pitchFamily="49" charset="0"/>
+              </a:rPr>
+              <a:t>superpixels</a:t>
+            </a:r>
+            <a:r>
+              <a:rPr lang="en-US" sz="1600" dirty="0">
+                <a:solidFill>
+                  <a:schemeClr val="bg2">
+                    <a:lumMod val="25000"/>
+                  </a:schemeClr>
+                </a:solidFill>
+                <a:latin typeface="Cascadia Code" panose="020B0609020000020004" pitchFamily="49" charset="0"/>
+                <a:cs typeface="Cascadia Code" panose="020B0609020000020004" pitchFamily="49" charset="0"/>
+              </a:rPr>
+              <a:t>: After calculating </a:t>
+            </a:r>
+            <a:r>
+              <a:rPr lang="en-US" altLang="en-US" sz="1600" b="1" dirty="0">
+                <a:solidFill>
+                  <a:schemeClr val="bg2">
+                    <a:lumMod val="25000"/>
+                  </a:schemeClr>
+                </a:solidFill>
+                <a:latin typeface="Cascadia Code" panose="020B0609020000020004" pitchFamily="49" charset="0"/>
+                <a:cs typeface="Cascadia Code" panose="020B0609020000020004" pitchFamily="49" charset="0"/>
+              </a:rPr>
+              <a:t>P_I(s | F(I)) </a:t>
+            </a:r>
+            <a:r>
+              <a:rPr lang="en-US" altLang="en-US" sz="1600" dirty="0">
+                <a:solidFill>
+                  <a:schemeClr val="bg2">
+                    <a:lumMod val="25000"/>
+                  </a:schemeClr>
+                </a:solidFill>
+                <a:latin typeface="Cascadia Code" panose="020B0609020000020004" pitchFamily="49" charset="0"/>
+                <a:cs typeface="Cascadia Code" panose="020B0609020000020004" pitchFamily="49" charset="0"/>
+              </a:rPr>
+              <a:t>for every </a:t>
+            </a:r>
+            <a:r>
+              <a:rPr lang="en-US" altLang="en-US" sz="1600" dirty="0" err="1">
+                <a:solidFill>
+                  <a:schemeClr val="bg2">
+                    <a:lumMod val="25000"/>
+                  </a:schemeClr>
+                </a:solidFill>
+                <a:latin typeface="Cascadia Code" panose="020B0609020000020004" pitchFamily="49" charset="0"/>
+                <a:cs typeface="Cascadia Code" panose="020B0609020000020004" pitchFamily="49" charset="0"/>
+              </a:rPr>
+              <a:t>superpixel</a:t>
+            </a:r>
+            <a:r>
+              <a:rPr lang="en-US" altLang="en-US" sz="1600" dirty="0">
+                <a:solidFill>
+                  <a:schemeClr val="bg2">
+                    <a:lumMod val="25000"/>
+                  </a:schemeClr>
+                </a:solidFill>
+                <a:latin typeface="Cascadia Code" panose="020B0609020000020004" pitchFamily="49" charset="0"/>
+                <a:cs typeface="Cascadia Code" panose="020B0609020000020004" pitchFamily="49" charset="0"/>
+              </a:rPr>
+              <a:t>, we create a seed </a:t>
+            </a:r>
+            <a:r>
+              <a:rPr lang="en-US" altLang="en-US" sz="1600" dirty="0" err="1">
+                <a:solidFill>
+                  <a:schemeClr val="bg2">
+                    <a:lumMod val="25000"/>
+                  </a:schemeClr>
+                </a:solidFill>
+                <a:latin typeface="Cascadia Code" panose="020B0609020000020004" pitchFamily="49" charset="0"/>
+                <a:cs typeface="Cascadia Code" panose="020B0609020000020004" pitchFamily="49" charset="0"/>
+              </a:rPr>
+              <a:t>superpixel</a:t>
+            </a:r>
+            <a:r>
+              <a:rPr lang="en-US" altLang="en-US" sz="1600" dirty="0">
+                <a:solidFill>
+                  <a:schemeClr val="bg2">
+                    <a:lumMod val="25000"/>
+                  </a:schemeClr>
+                </a:solidFill>
+                <a:latin typeface="Cascadia Code" panose="020B0609020000020004" pitchFamily="49" charset="0"/>
+                <a:cs typeface="Cascadia Code" panose="020B0609020000020004" pitchFamily="49" charset="0"/>
+              </a:rPr>
+              <a:t> set with a percentile threshold. These </a:t>
+            </a:r>
+            <a:r>
+              <a:rPr lang="en-US" altLang="en-US" sz="1600" dirty="0" err="1">
+                <a:solidFill>
+                  <a:schemeClr val="bg2">
+                    <a:lumMod val="25000"/>
+                  </a:schemeClr>
+                </a:solidFill>
+                <a:latin typeface="Cascadia Code" panose="020B0609020000020004" pitchFamily="49" charset="0"/>
+                <a:cs typeface="Cascadia Code" panose="020B0609020000020004" pitchFamily="49" charset="0"/>
+              </a:rPr>
+              <a:t>superpixels</a:t>
+            </a:r>
+            <a:r>
+              <a:rPr lang="en-US" altLang="en-US" sz="1600" dirty="0">
+                <a:solidFill>
+                  <a:schemeClr val="bg2">
+                    <a:lumMod val="25000"/>
+                  </a:schemeClr>
+                </a:solidFill>
+                <a:latin typeface="Cascadia Code" panose="020B0609020000020004" pitchFamily="49" charset="0"/>
+                <a:cs typeface="Cascadia Code" panose="020B0609020000020004" pitchFamily="49" charset="0"/>
+              </a:rPr>
+              <a:t> will be the starting point of the algorithm.</a:t>
+            </a:r>
+          </a:p>
+          <a:p>
+            <a:r>
+              <a:rPr lang="en-US" sz="1600" dirty="0">
+                <a:solidFill>
+                  <a:schemeClr val="bg2">
+                    <a:lumMod val="25000"/>
+                  </a:schemeClr>
+                </a:solidFill>
+                <a:latin typeface="Cascadia Code" panose="020B0609020000020004" pitchFamily="49" charset="0"/>
+                <a:cs typeface="Cascadia Code" panose="020B0609020000020004" pitchFamily="49" charset="0"/>
+              </a:rPr>
+              <a:t>2. After selecting seed </a:t>
+            </a:r>
+            <a:r>
+              <a:rPr lang="en-US" sz="1600" dirty="0" err="1">
+                <a:solidFill>
+                  <a:schemeClr val="bg2">
+                    <a:lumMod val="25000"/>
+                  </a:schemeClr>
+                </a:solidFill>
+                <a:latin typeface="Cascadia Code" panose="020B0609020000020004" pitchFamily="49" charset="0"/>
+                <a:cs typeface="Cascadia Code" panose="020B0609020000020004" pitchFamily="49" charset="0"/>
+              </a:rPr>
+              <a:t>superpixels</a:t>
+            </a:r>
+            <a:r>
+              <a:rPr lang="en-US" sz="1600" dirty="0">
+                <a:solidFill>
+                  <a:schemeClr val="bg2">
+                    <a:lumMod val="25000"/>
+                  </a:schemeClr>
+                </a:solidFill>
+                <a:latin typeface="Cascadia Code" panose="020B0609020000020004" pitchFamily="49" charset="0"/>
+                <a:cs typeface="Cascadia Code" panose="020B0609020000020004" pitchFamily="49" charset="0"/>
+              </a:rPr>
+              <a:t>: Create two sets, skin </a:t>
+            </a:r>
+            <a:r>
+              <a:rPr lang="en-US" sz="1600" dirty="0" err="1">
+                <a:solidFill>
+                  <a:schemeClr val="bg2">
+                    <a:lumMod val="25000"/>
+                  </a:schemeClr>
+                </a:solidFill>
+                <a:latin typeface="Cascadia Code" panose="020B0609020000020004" pitchFamily="49" charset="0"/>
+                <a:cs typeface="Cascadia Code" panose="020B0609020000020004" pitchFamily="49" charset="0"/>
+              </a:rPr>
+              <a:t>superpixels</a:t>
+            </a:r>
+            <a:r>
+              <a:rPr lang="en-US" sz="1600" dirty="0">
+                <a:solidFill>
+                  <a:schemeClr val="bg2">
+                    <a:lumMod val="25000"/>
+                  </a:schemeClr>
+                </a:solidFill>
+                <a:latin typeface="Cascadia Code" panose="020B0609020000020004" pitchFamily="49" charset="0"/>
+                <a:cs typeface="Cascadia Code" panose="020B0609020000020004" pitchFamily="49" charset="0"/>
+              </a:rPr>
+              <a:t> </a:t>
+            </a:r>
+            <a:r>
+              <a:rPr lang="en-US" sz="1600" b="1" dirty="0" err="1">
+                <a:solidFill>
+                  <a:schemeClr val="bg2">
+                    <a:lumMod val="25000"/>
+                  </a:schemeClr>
+                </a:solidFill>
+                <a:latin typeface="Cascadia Code" panose="020B0609020000020004" pitchFamily="49" charset="0"/>
+                <a:cs typeface="Cascadia Code" panose="020B0609020000020004" pitchFamily="49" charset="0"/>
+              </a:rPr>
+              <a:t>sp_s</a:t>
+            </a:r>
+            <a:r>
+              <a:rPr lang="en-US" sz="1600" b="1" dirty="0">
+                <a:solidFill>
+                  <a:schemeClr val="bg2">
+                    <a:lumMod val="25000"/>
+                  </a:schemeClr>
+                </a:solidFill>
+                <a:latin typeface="Cascadia Code" panose="020B0609020000020004" pitchFamily="49" charset="0"/>
+                <a:cs typeface="Cascadia Code" panose="020B0609020000020004" pitchFamily="49" charset="0"/>
+              </a:rPr>
+              <a:t> </a:t>
+            </a:r>
+            <a:r>
+              <a:rPr lang="en-US" sz="1600" dirty="0">
+                <a:solidFill>
+                  <a:schemeClr val="bg2">
+                    <a:lumMod val="25000"/>
+                  </a:schemeClr>
+                </a:solidFill>
+                <a:latin typeface="Cascadia Code" panose="020B0609020000020004" pitchFamily="49" charset="0"/>
+                <a:cs typeface="Cascadia Code" panose="020B0609020000020004" pitchFamily="49" charset="0"/>
+              </a:rPr>
+              <a:t>and non-skin </a:t>
+            </a:r>
+            <a:r>
+              <a:rPr lang="en-US" sz="1600" dirty="0" err="1">
+                <a:solidFill>
+                  <a:schemeClr val="bg2">
+                    <a:lumMod val="25000"/>
+                  </a:schemeClr>
+                </a:solidFill>
+                <a:latin typeface="Cascadia Code" panose="020B0609020000020004" pitchFamily="49" charset="0"/>
+                <a:cs typeface="Cascadia Code" panose="020B0609020000020004" pitchFamily="49" charset="0"/>
+              </a:rPr>
+              <a:t>superpixels</a:t>
+            </a:r>
+            <a:r>
+              <a:rPr lang="en-US" sz="1600" b="1" dirty="0">
+                <a:solidFill>
+                  <a:schemeClr val="bg2">
+                    <a:lumMod val="25000"/>
+                  </a:schemeClr>
+                </a:solidFill>
+                <a:latin typeface="Cascadia Code" panose="020B0609020000020004" pitchFamily="49" charset="0"/>
+                <a:cs typeface="Cascadia Code" panose="020B0609020000020004" pitchFamily="49" charset="0"/>
+              </a:rPr>
+              <a:t> </a:t>
+            </a:r>
+            <a:r>
+              <a:rPr lang="en-US" sz="1600" b="1" dirty="0" err="1">
+                <a:solidFill>
+                  <a:schemeClr val="bg2">
+                    <a:lumMod val="25000"/>
+                  </a:schemeClr>
+                </a:solidFill>
+                <a:latin typeface="Cascadia Code" panose="020B0609020000020004" pitchFamily="49" charset="0"/>
+                <a:cs typeface="Cascadia Code" panose="020B0609020000020004" pitchFamily="49" charset="0"/>
+              </a:rPr>
+              <a:t>sp_ns</a:t>
+            </a:r>
+            <a:r>
+              <a:rPr lang="en-US" sz="1600" dirty="0">
+                <a:solidFill>
+                  <a:schemeClr val="bg2">
+                    <a:lumMod val="25000"/>
+                  </a:schemeClr>
+                </a:solidFill>
+                <a:latin typeface="Cascadia Code" panose="020B0609020000020004" pitchFamily="49" charset="0"/>
+                <a:cs typeface="Cascadia Code" panose="020B0609020000020004" pitchFamily="49" charset="0"/>
+              </a:rPr>
+              <a:t>. Initialize </a:t>
+            </a:r>
+            <a:r>
+              <a:rPr lang="en-US" sz="1600" b="1" dirty="0" err="1">
+                <a:solidFill>
+                  <a:schemeClr val="bg2">
+                    <a:lumMod val="25000"/>
+                  </a:schemeClr>
+                </a:solidFill>
+                <a:latin typeface="Cascadia Code" panose="020B0609020000020004" pitchFamily="49" charset="0"/>
+                <a:cs typeface="Cascadia Code" panose="020B0609020000020004" pitchFamily="49" charset="0"/>
+              </a:rPr>
+              <a:t>sp_s</a:t>
+            </a:r>
+            <a:r>
+              <a:rPr lang="en-US" sz="1600" b="1" dirty="0">
+                <a:solidFill>
+                  <a:schemeClr val="bg2">
+                    <a:lumMod val="25000"/>
+                  </a:schemeClr>
+                </a:solidFill>
+                <a:latin typeface="Cascadia Code" panose="020B0609020000020004" pitchFamily="49" charset="0"/>
+                <a:cs typeface="Cascadia Code" panose="020B0609020000020004" pitchFamily="49" charset="0"/>
+              </a:rPr>
+              <a:t> </a:t>
+            </a:r>
+            <a:r>
+              <a:rPr lang="en-US" sz="1600" dirty="0">
+                <a:solidFill>
+                  <a:schemeClr val="bg2">
+                    <a:lumMod val="25000"/>
+                  </a:schemeClr>
+                </a:solidFill>
+                <a:latin typeface="Cascadia Code" panose="020B0609020000020004" pitchFamily="49" charset="0"/>
+                <a:cs typeface="Cascadia Code" panose="020B0609020000020004" pitchFamily="49" charset="0"/>
+              </a:rPr>
+              <a:t>with seed </a:t>
+            </a:r>
+            <a:r>
+              <a:rPr lang="en-US" sz="1600" dirty="0" err="1">
+                <a:solidFill>
+                  <a:schemeClr val="bg2">
+                    <a:lumMod val="25000"/>
+                  </a:schemeClr>
+                </a:solidFill>
+                <a:latin typeface="Cascadia Code" panose="020B0609020000020004" pitchFamily="49" charset="0"/>
+                <a:cs typeface="Cascadia Code" panose="020B0609020000020004" pitchFamily="49" charset="0"/>
+              </a:rPr>
+              <a:t>superpixels</a:t>
+            </a:r>
+            <a:r>
+              <a:rPr lang="en-US" sz="1600" dirty="0">
+                <a:solidFill>
+                  <a:schemeClr val="bg2">
+                    <a:lumMod val="25000"/>
+                  </a:schemeClr>
+                </a:solidFill>
+                <a:latin typeface="Cascadia Code" panose="020B0609020000020004" pitchFamily="49" charset="0"/>
+                <a:cs typeface="Cascadia Code" panose="020B0609020000020004" pitchFamily="49" charset="0"/>
+              </a:rPr>
+              <a:t> and known skin </a:t>
+            </a:r>
+            <a:r>
+              <a:rPr lang="en-US" sz="1600" dirty="0" err="1">
+                <a:solidFill>
+                  <a:schemeClr val="bg2">
+                    <a:lumMod val="25000"/>
+                  </a:schemeClr>
+                </a:solidFill>
+                <a:latin typeface="Cascadia Code" panose="020B0609020000020004" pitchFamily="49" charset="0"/>
+                <a:cs typeface="Cascadia Code" panose="020B0609020000020004" pitchFamily="49" charset="0"/>
+              </a:rPr>
+              <a:t>superpixels</a:t>
+            </a:r>
+            <a:r>
+              <a:rPr lang="en-US" sz="1600" dirty="0">
+                <a:solidFill>
+                  <a:schemeClr val="bg2">
+                    <a:lumMod val="25000"/>
+                  </a:schemeClr>
+                </a:solidFill>
+                <a:latin typeface="Cascadia Code" panose="020B0609020000020004" pitchFamily="49" charset="0"/>
+                <a:cs typeface="Cascadia Code" panose="020B0609020000020004" pitchFamily="49" charset="0"/>
+              </a:rPr>
+              <a:t> (these are extracted from the skin mask).</a:t>
+            </a:r>
+          </a:p>
+          <a:p>
+            <a:r>
+              <a:rPr lang="en-US" sz="1600" dirty="0">
+                <a:solidFill>
+                  <a:schemeClr val="bg2">
+                    <a:lumMod val="25000"/>
+                  </a:schemeClr>
+                </a:solidFill>
+                <a:latin typeface="Cascadia Code" panose="020B0609020000020004" pitchFamily="49" charset="0"/>
+                <a:cs typeface="Cascadia Code" panose="020B0609020000020004" pitchFamily="49" charset="0"/>
+              </a:rPr>
+              <a:t>3. For each </a:t>
+            </a:r>
+            <a:r>
+              <a:rPr lang="en-US" sz="1600" dirty="0" err="1">
+                <a:solidFill>
+                  <a:schemeClr val="bg2">
+                    <a:lumMod val="25000"/>
+                  </a:schemeClr>
+                </a:solidFill>
+                <a:latin typeface="Cascadia Code" panose="020B0609020000020004" pitchFamily="49" charset="0"/>
+                <a:cs typeface="Cascadia Code" panose="020B0609020000020004" pitchFamily="49" charset="0"/>
+              </a:rPr>
+              <a:t>superpixel</a:t>
+            </a:r>
+            <a:r>
+              <a:rPr lang="en-US" sz="1600" dirty="0">
+                <a:solidFill>
+                  <a:schemeClr val="bg2">
+                    <a:lumMod val="25000"/>
+                  </a:schemeClr>
+                </a:solidFill>
+                <a:latin typeface="Cascadia Code" panose="020B0609020000020004" pitchFamily="49" charset="0"/>
+                <a:cs typeface="Cascadia Code" panose="020B0609020000020004" pitchFamily="49" charset="0"/>
+              </a:rPr>
+              <a:t> in </a:t>
+            </a:r>
+            <a:r>
+              <a:rPr lang="en-US" sz="1600" b="1" dirty="0" err="1">
+                <a:solidFill>
+                  <a:schemeClr val="bg2">
+                    <a:lumMod val="25000"/>
+                  </a:schemeClr>
+                </a:solidFill>
+                <a:latin typeface="Cascadia Code" panose="020B0609020000020004" pitchFamily="49" charset="0"/>
+                <a:cs typeface="Cascadia Code" panose="020B0609020000020004" pitchFamily="49" charset="0"/>
+              </a:rPr>
+              <a:t>sp_s</a:t>
+            </a:r>
+            <a:r>
+              <a:rPr lang="en-US" sz="1600" dirty="0">
+                <a:solidFill>
+                  <a:schemeClr val="bg2">
+                    <a:lumMod val="25000"/>
+                  </a:schemeClr>
+                </a:solidFill>
+                <a:latin typeface="Cascadia Code" panose="020B0609020000020004" pitchFamily="49" charset="0"/>
+                <a:cs typeface="Cascadia Code" panose="020B0609020000020004" pitchFamily="49" charset="0"/>
+              </a:rPr>
+              <a:t> we calculate all valid neighbors </a:t>
+            </a:r>
+            <a:r>
+              <a:rPr lang="en-US" sz="1600" b="1" dirty="0" err="1">
+                <a:solidFill>
+                  <a:schemeClr val="bg2">
+                    <a:lumMod val="25000"/>
+                  </a:schemeClr>
+                </a:solidFill>
+                <a:latin typeface="Cascadia Code" panose="020B0609020000020004" pitchFamily="49" charset="0"/>
+                <a:cs typeface="Cascadia Code" panose="020B0609020000020004" pitchFamily="49" charset="0"/>
+              </a:rPr>
+              <a:t>N_sp</a:t>
+            </a:r>
+            <a:r>
+              <a:rPr lang="en-US" sz="1600" dirty="0">
+                <a:solidFill>
+                  <a:schemeClr val="bg2">
+                    <a:lumMod val="25000"/>
+                  </a:schemeClr>
+                </a:solidFill>
+                <a:latin typeface="Cascadia Code" panose="020B0609020000020004" pitchFamily="49" charset="0"/>
+                <a:cs typeface="Cascadia Code" panose="020B0609020000020004" pitchFamily="49" charset="0"/>
+              </a:rPr>
+              <a:t>. A </a:t>
+            </a:r>
+            <a:r>
+              <a:rPr lang="en-US" sz="1600" dirty="0" err="1">
+                <a:solidFill>
+                  <a:schemeClr val="bg2">
+                    <a:lumMod val="25000"/>
+                  </a:schemeClr>
+                </a:solidFill>
+                <a:latin typeface="Cascadia Code" panose="020B0609020000020004" pitchFamily="49" charset="0"/>
+                <a:cs typeface="Cascadia Code" panose="020B0609020000020004" pitchFamily="49" charset="0"/>
+              </a:rPr>
+              <a:t>superpixel</a:t>
+            </a:r>
+            <a:r>
+              <a:rPr lang="en-US" sz="1600" dirty="0">
+                <a:solidFill>
+                  <a:schemeClr val="bg2">
+                    <a:lumMod val="25000"/>
+                  </a:schemeClr>
+                </a:solidFill>
+                <a:latin typeface="Cascadia Code" panose="020B0609020000020004" pitchFamily="49" charset="0"/>
+                <a:cs typeface="Cascadia Code" panose="020B0609020000020004" pitchFamily="49" charset="0"/>
+              </a:rPr>
+              <a:t> is a valid neighbor if it is in neither </a:t>
+            </a:r>
+            <a:r>
+              <a:rPr lang="en-US" sz="1600" b="1" dirty="0" err="1">
+                <a:solidFill>
+                  <a:schemeClr val="bg2">
+                    <a:lumMod val="25000"/>
+                  </a:schemeClr>
+                </a:solidFill>
+                <a:latin typeface="Cascadia Code" panose="020B0609020000020004" pitchFamily="49" charset="0"/>
+                <a:cs typeface="Cascadia Code" panose="020B0609020000020004" pitchFamily="49" charset="0"/>
+              </a:rPr>
+              <a:t>sp_s</a:t>
+            </a:r>
+            <a:r>
+              <a:rPr lang="en-US" sz="1600" b="1" dirty="0">
+                <a:solidFill>
+                  <a:schemeClr val="bg2">
+                    <a:lumMod val="25000"/>
+                  </a:schemeClr>
+                </a:solidFill>
+                <a:latin typeface="Cascadia Code" panose="020B0609020000020004" pitchFamily="49" charset="0"/>
+                <a:cs typeface="Cascadia Code" panose="020B0609020000020004" pitchFamily="49" charset="0"/>
+              </a:rPr>
+              <a:t> </a:t>
+            </a:r>
+            <a:r>
+              <a:rPr lang="en-US" sz="1600" dirty="0">
+                <a:solidFill>
+                  <a:schemeClr val="bg2">
+                    <a:lumMod val="25000"/>
+                  </a:schemeClr>
+                </a:solidFill>
+                <a:latin typeface="Cascadia Code" panose="020B0609020000020004" pitchFamily="49" charset="0"/>
+                <a:cs typeface="Cascadia Code" panose="020B0609020000020004" pitchFamily="49" charset="0"/>
+              </a:rPr>
+              <a:t>or </a:t>
+            </a:r>
+            <a:r>
+              <a:rPr lang="en-US" sz="1600" b="1" dirty="0" err="1">
+                <a:solidFill>
+                  <a:schemeClr val="bg2">
+                    <a:lumMod val="25000"/>
+                  </a:schemeClr>
+                </a:solidFill>
+                <a:latin typeface="Cascadia Code" panose="020B0609020000020004" pitchFamily="49" charset="0"/>
+                <a:cs typeface="Cascadia Code" panose="020B0609020000020004" pitchFamily="49" charset="0"/>
+              </a:rPr>
+              <a:t>sp_ns</a:t>
+            </a:r>
+            <a:r>
+              <a:rPr lang="en-US" sz="1600" b="1" dirty="0">
+                <a:solidFill>
+                  <a:schemeClr val="bg2">
+                    <a:lumMod val="25000"/>
+                  </a:schemeClr>
+                </a:solidFill>
+                <a:latin typeface="Cascadia Code" panose="020B0609020000020004" pitchFamily="49" charset="0"/>
+                <a:cs typeface="Cascadia Code" panose="020B0609020000020004" pitchFamily="49" charset="0"/>
+              </a:rPr>
+              <a:t>.</a:t>
+            </a:r>
+            <a:endParaRPr lang="en-US" sz="1600" dirty="0">
+              <a:solidFill>
+                <a:schemeClr val="bg2">
+                  <a:lumMod val="25000"/>
+                </a:schemeClr>
+              </a:solidFill>
+              <a:latin typeface="Cascadia Code" panose="020B0609020000020004" pitchFamily="49" charset="0"/>
+              <a:cs typeface="Cascadia Code" panose="020B0609020000020004" pitchFamily="49" charset="0"/>
+            </a:endParaRPr>
+          </a:p>
+        </p:txBody>
+      </p:sp>
+    </p:spTree>
+    <p:extLst>
+      <p:ext uri="{BB962C8B-B14F-4D97-AF65-F5344CB8AC3E}">
+        <p14:creationId xmlns:p14="http://schemas.microsoft.com/office/powerpoint/2010/main" val="385021485"/>
+      </p:ext>
+    </p:extLst>
+  </p:cSld>
+  <p:clrMapOvr>
+    <a:masterClrMapping/>
+  </p:clrMapOvr>
+</p:sld>
+</file>
+
+<file path=ppt/slides/slide15.xml><?xml version="1.0" encoding="utf-8"?>
+<p:sld xmlns:a="http://schemas.openxmlformats.org/drawingml/2006/main" xmlns:r="http://schemas.openxmlformats.org/officeDocument/2006/relationships" xmlns:p="http://schemas.openxmlformats.org/presentationml/2006/main">
+  <p:cSld>
+    <p:spTree>
+      <p:nvGrpSpPr>
+        <p:cNvPr id="1" name="">
+          <a:extLst>
+            <a:ext uri="{FF2B5EF4-FFF2-40B4-BE49-F238E27FC236}">
+              <a16:creationId xmlns:a16="http://schemas.microsoft.com/office/drawing/2014/main" id="{3CF49054-8E43-2054-0E5D-DEC763F2A8E9}"/>
+            </a:ext>
+          </a:extLst>
+        </p:cNvPr>
+        <p:cNvGrpSpPr/>
+        <p:nvPr/>
+      </p:nvGrpSpPr>
+      <p:grpSpPr>
+        <a:xfrm>
+          <a:off x="0" y="0"/>
+          <a:ext cx="0" cy="0"/>
+          <a:chOff x="0" y="0"/>
+          <a:chExt cx="0" cy="0"/>
+        </a:xfrm>
+      </p:grpSpPr>
+      <p:sp>
+        <p:nvSpPr>
+          <p:cNvPr id="3" name="Slide Number Placeholder 2">
+            <a:extLst>
+              <a:ext uri="{FF2B5EF4-FFF2-40B4-BE49-F238E27FC236}">
+                <a16:creationId xmlns:a16="http://schemas.microsoft.com/office/drawing/2014/main" id="{8B563C67-C001-611E-4DD3-EE7DB0A65927}"/>
+              </a:ext>
+            </a:extLst>
+          </p:cNvPr>
+          <p:cNvSpPr>
+            <a:spLocks noGrp="1"/>
+          </p:cNvSpPr>
+          <p:nvPr>
+            <p:ph type="sldNum" sz="quarter" idx="12"/>
+          </p:nvPr>
+        </p:nvSpPr>
+        <p:spPr/>
+        <p:txBody>
+          <a:bodyPr/>
+          <a:lstStyle/>
+          <a:p>
+            <a:r>
+              <a:rPr lang="en-US" dirty="0">
+                <a:solidFill>
+                  <a:schemeClr val="bg2">
+                    <a:lumMod val="25000"/>
+                  </a:schemeClr>
+                </a:solidFill>
+                <a:latin typeface="Cascadia Code" panose="020B0609020000020004" pitchFamily="49" charset="0"/>
+                <a:cs typeface="Cascadia Code" panose="020B0609020000020004" pitchFamily="49" charset="0"/>
+              </a:rPr>
+              <a:t>7</a:t>
+            </a:r>
+          </a:p>
+        </p:txBody>
+      </p:sp>
+      <p:sp>
+        <p:nvSpPr>
+          <p:cNvPr id="4" name="Content Placeholder 3">
+            <a:extLst>
+              <a:ext uri="{FF2B5EF4-FFF2-40B4-BE49-F238E27FC236}">
+                <a16:creationId xmlns:a16="http://schemas.microsoft.com/office/drawing/2014/main" id="{902C4748-070F-2B1B-68B9-BF3EE56DB249}"/>
+              </a:ext>
+            </a:extLst>
+          </p:cNvPr>
+          <p:cNvSpPr>
+            <a:spLocks noGrp="1"/>
+          </p:cNvSpPr>
+          <p:nvPr>
+            <p:ph idx="1"/>
+          </p:nvPr>
+        </p:nvSpPr>
+        <p:spPr>
+          <a:xfrm>
+            <a:off x="1311274" y="609600"/>
+            <a:ext cx="10345738" cy="5943600"/>
+          </a:xfrm>
+        </p:spPr>
+        <p:txBody>
+          <a:bodyPr>
+            <a:normAutofit/>
+          </a:bodyPr>
+          <a:lstStyle/>
+          <a:p>
+            <a:pPr>
+              <a:buNone/>
+            </a:pPr>
+            <a:r>
+              <a:rPr lang="en-US" sz="1600" dirty="0">
+                <a:solidFill>
+                  <a:schemeClr val="bg2">
+                    <a:lumMod val="25000"/>
+                  </a:schemeClr>
+                </a:solidFill>
+                <a:latin typeface="Cascadia Code" panose="020B0609020000020004" pitchFamily="49" charset="0"/>
+                <a:cs typeface="Cascadia Code" panose="020B0609020000020004" pitchFamily="49" charset="0"/>
+              </a:rPr>
+              <a:t>4. For each neighboring </a:t>
+            </a:r>
+            <a:r>
+              <a:rPr lang="en-US" sz="1600" dirty="0" err="1">
+                <a:solidFill>
+                  <a:schemeClr val="bg2">
+                    <a:lumMod val="25000"/>
+                  </a:schemeClr>
+                </a:solidFill>
+                <a:latin typeface="Cascadia Code" panose="020B0609020000020004" pitchFamily="49" charset="0"/>
+                <a:cs typeface="Cascadia Code" panose="020B0609020000020004" pitchFamily="49" charset="0"/>
+              </a:rPr>
+              <a:t>superpixel</a:t>
+            </a:r>
+            <a:r>
+              <a:rPr lang="en-US" sz="1600" dirty="0">
+                <a:solidFill>
+                  <a:schemeClr val="bg2">
+                    <a:lumMod val="25000"/>
+                  </a:schemeClr>
+                </a:solidFill>
+                <a:latin typeface="Cascadia Code" panose="020B0609020000020004" pitchFamily="49" charset="0"/>
+                <a:cs typeface="Cascadia Code" panose="020B0609020000020004" pitchFamily="49" charset="0"/>
+              </a:rPr>
+              <a:t> </a:t>
+            </a:r>
+            <a:r>
+              <a:rPr lang="en-US" sz="1600" b="1" dirty="0" err="1">
+                <a:solidFill>
+                  <a:schemeClr val="bg2">
+                    <a:lumMod val="25000"/>
+                  </a:schemeClr>
+                </a:solidFill>
+                <a:latin typeface="Cascadia Code" panose="020B0609020000020004" pitchFamily="49" charset="0"/>
+                <a:cs typeface="Cascadia Code" panose="020B0609020000020004" pitchFamily="49" charset="0"/>
+              </a:rPr>
+              <a:t>sp_i</a:t>
+            </a:r>
+            <a:r>
+              <a:rPr lang="en-US" sz="1600" dirty="0">
+                <a:solidFill>
+                  <a:schemeClr val="bg2">
+                    <a:lumMod val="25000"/>
+                  </a:schemeClr>
+                </a:solidFill>
+                <a:latin typeface="Cascadia Code" panose="020B0609020000020004" pitchFamily="49" charset="0"/>
+                <a:cs typeface="Cascadia Code" panose="020B0609020000020004" pitchFamily="49" charset="0"/>
+              </a:rPr>
+              <a:t>, we calculate </a:t>
+            </a:r>
+            <a:r>
+              <a:rPr lang="en-US" sz="1600" b="1" dirty="0" err="1">
+                <a:solidFill>
+                  <a:schemeClr val="bg2">
+                    <a:lumMod val="25000"/>
+                  </a:schemeClr>
+                </a:solidFill>
+                <a:latin typeface="Cascadia Code" panose="020B0609020000020004" pitchFamily="49" charset="0"/>
+                <a:cs typeface="Cascadia Code" panose="020B0609020000020004" pitchFamily="49" charset="0"/>
+              </a:rPr>
+              <a:t>P_i_new</a:t>
+            </a:r>
+            <a:r>
+              <a:rPr lang="en-US" sz="1600" b="1" dirty="0">
+                <a:solidFill>
+                  <a:schemeClr val="bg2">
+                    <a:lumMod val="25000"/>
+                  </a:schemeClr>
+                </a:solidFill>
+                <a:latin typeface="Cascadia Code" panose="020B0609020000020004" pitchFamily="49" charset="0"/>
+                <a:cs typeface="Cascadia Code" panose="020B0609020000020004" pitchFamily="49" charset="0"/>
+              </a:rPr>
+              <a:t> </a:t>
+            </a:r>
+            <a:r>
+              <a:rPr lang="en-US" sz="1600" dirty="0">
+                <a:solidFill>
+                  <a:schemeClr val="bg2">
+                    <a:lumMod val="25000"/>
+                  </a:schemeClr>
+                </a:solidFill>
+                <a:latin typeface="Cascadia Code" panose="020B0609020000020004" pitchFamily="49" charset="0"/>
+                <a:cs typeface="Cascadia Code" panose="020B0609020000020004" pitchFamily="49" charset="0"/>
+              </a:rPr>
+              <a:t>defined as below:</a:t>
+            </a:r>
+          </a:p>
+          <a:p>
+            <a:pPr>
+              <a:lnSpc>
+                <a:spcPct val="20000"/>
+              </a:lnSpc>
+              <a:buNone/>
+            </a:pPr>
+            <a:r>
+              <a:rPr lang="en-US" sz="1600" dirty="0">
+                <a:solidFill>
+                  <a:schemeClr val="bg2">
+                    <a:lumMod val="25000"/>
+                  </a:schemeClr>
+                </a:solidFill>
+                <a:latin typeface="Cascadia Code" panose="020B0609020000020004" pitchFamily="49" charset="0"/>
+                <a:cs typeface="Cascadia Code" panose="020B0609020000020004" pitchFamily="49" charset="0"/>
+              </a:rPr>
+              <a:t>5. If </a:t>
+            </a:r>
+            <a:r>
+              <a:rPr lang="en-US" sz="1600" b="1" dirty="0" err="1">
+                <a:solidFill>
+                  <a:schemeClr val="bg2">
+                    <a:lumMod val="25000"/>
+                  </a:schemeClr>
+                </a:solidFill>
+                <a:latin typeface="Cascadia Code" panose="020B0609020000020004" pitchFamily="49" charset="0"/>
+                <a:cs typeface="Cascadia Code" panose="020B0609020000020004" pitchFamily="49" charset="0"/>
+              </a:rPr>
+              <a:t>P_i_new</a:t>
+            </a:r>
+            <a:r>
+              <a:rPr lang="en-US" sz="1600" b="1" dirty="0">
+                <a:solidFill>
+                  <a:schemeClr val="bg2">
+                    <a:lumMod val="25000"/>
+                  </a:schemeClr>
+                </a:solidFill>
+                <a:latin typeface="Cascadia Code" panose="020B0609020000020004" pitchFamily="49" charset="0"/>
+                <a:cs typeface="Cascadia Code" panose="020B0609020000020004" pitchFamily="49" charset="0"/>
+              </a:rPr>
+              <a:t> &gt;</a:t>
+            </a:r>
+            <a:r>
+              <a:rPr lang="en-US" sz="1600" dirty="0">
+                <a:solidFill>
+                  <a:schemeClr val="bg2">
+                    <a:lumMod val="25000"/>
+                  </a:schemeClr>
+                </a:solidFill>
+                <a:latin typeface="Cascadia Code" panose="020B0609020000020004" pitchFamily="49" charset="0"/>
+                <a:cs typeface="Cascadia Code" panose="020B0609020000020004" pitchFamily="49" charset="0"/>
+              </a:rPr>
+              <a:t> </a:t>
+            </a:r>
+            <a:r>
+              <a:rPr lang="en-US" sz="1600" b="1" dirty="0">
+                <a:solidFill>
+                  <a:schemeClr val="bg2">
+                    <a:lumMod val="25000"/>
+                  </a:schemeClr>
+                </a:solidFill>
+                <a:latin typeface="Cascadia Code" panose="020B0609020000020004" pitchFamily="49" charset="0"/>
+                <a:cs typeface="Cascadia Code" panose="020B0609020000020004" pitchFamily="49" charset="0"/>
+              </a:rPr>
+              <a:t>T_F:</a:t>
+            </a:r>
+          </a:p>
+          <a:p>
+            <a:pPr>
+              <a:lnSpc>
+                <a:spcPct val="20000"/>
+              </a:lnSpc>
+              <a:buNone/>
+            </a:pPr>
+            <a:r>
+              <a:rPr lang="en-US" sz="1600" b="1" dirty="0">
+                <a:solidFill>
+                  <a:schemeClr val="bg2">
+                    <a:lumMod val="25000"/>
+                  </a:schemeClr>
+                </a:solidFill>
+                <a:latin typeface="Cascadia Code" panose="020B0609020000020004" pitchFamily="49" charset="0"/>
+                <a:cs typeface="Cascadia Code" panose="020B0609020000020004" pitchFamily="49" charset="0"/>
+              </a:rPr>
+              <a:t>	</a:t>
+            </a:r>
+            <a:r>
+              <a:rPr lang="en-US" sz="1600" b="1" dirty="0" err="1">
+                <a:solidFill>
+                  <a:schemeClr val="bg2">
+                    <a:lumMod val="25000"/>
+                  </a:schemeClr>
+                </a:solidFill>
+                <a:latin typeface="Cascadia Code" panose="020B0609020000020004" pitchFamily="49" charset="0"/>
+                <a:cs typeface="Cascadia Code" panose="020B0609020000020004" pitchFamily="49" charset="0"/>
+              </a:rPr>
+              <a:t>sp_s.add</a:t>
+            </a:r>
+            <a:r>
+              <a:rPr lang="en-US" sz="1600" b="1" dirty="0">
+                <a:solidFill>
+                  <a:schemeClr val="bg2">
+                    <a:lumMod val="25000"/>
+                  </a:schemeClr>
+                </a:solidFill>
+                <a:latin typeface="Cascadia Code" panose="020B0609020000020004" pitchFamily="49" charset="0"/>
+                <a:cs typeface="Cascadia Code" panose="020B0609020000020004" pitchFamily="49" charset="0"/>
+              </a:rPr>
+              <a:t>(</a:t>
+            </a:r>
+            <a:r>
+              <a:rPr lang="en-US" sz="1600" b="1" dirty="0" err="1">
+                <a:solidFill>
+                  <a:schemeClr val="bg2">
+                    <a:lumMod val="25000"/>
+                  </a:schemeClr>
+                </a:solidFill>
+                <a:latin typeface="Cascadia Code" panose="020B0609020000020004" pitchFamily="49" charset="0"/>
+                <a:cs typeface="Cascadia Code" panose="020B0609020000020004" pitchFamily="49" charset="0"/>
+              </a:rPr>
+              <a:t>sp_i</a:t>
+            </a:r>
+            <a:r>
+              <a:rPr lang="en-US" sz="1600" b="1" dirty="0">
+                <a:solidFill>
+                  <a:schemeClr val="bg2">
+                    <a:lumMod val="25000"/>
+                  </a:schemeClr>
+                </a:solidFill>
+                <a:latin typeface="Cascadia Code" panose="020B0609020000020004" pitchFamily="49" charset="0"/>
+                <a:cs typeface="Cascadia Code" panose="020B0609020000020004" pitchFamily="49" charset="0"/>
+              </a:rPr>
+              <a:t>)</a:t>
+            </a:r>
+          </a:p>
+          <a:p>
+            <a:pPr>
+              <a:lnSpc>
+                <a:spcPct val="20000"/>
+              </a:lnSpc>
+              <a:buNone/>
+            </a:pPr>
+            <a:r>
+              <a:rPr lang="en-US" sz="1600" b="1" dirty="0">
+                <a:solidFill>
+                  <a:schemeClr val="bg2">
+                    <a:lumMod val="25000"/>
+                  </a:schemeClr>
+                </a:solidFill>
+                <a:latin typeface="Cascadia Code" panose="020B0609020000020004" pitchFamily="49" charset="0"/>
+                <a:cs typeface="Cascadia Code" panose="020B0609020000020004" pitchFamily="49" charset="0"/>
+              </a:rPr>
+              <a:t>   </a:t>
+            </a:r>
+            <a:r>
+              <a:rPr lang="en-US" sz="1600" dirty="0">
+                <a:solidFill>
+                  <a:schemeClr val="bg2">
+                    <a:lumMod val="25000"/>
+                  </a:schemeClr>
+                </a:solidFill>
+                <a:latin typeface="Cascadia Code" panose="020B0609020000020004" pitchFamily="49" charset="0"/>
+                <a:cs typeface="Cascadia Code" panose="020B0609020000020004" pitchFamily="49" charset="0"/>
+              </a:rPr>
+              <a:t>Else:</a:t>
+            </a:r>
+          </a:p>
+          <a:p>
+            <a:pPr>
+              <a:lnSpc>
+                <a:spcPct val="20000"/>
+              </a:lnSpc>
+              <a:buNone/>
+            </a:pPr>
+            <a:r>
+              <a:rPr lang="en-US" sz="1600" b="1" dirty="0">
+                <a:solidFill>
+                  <a:schemeClr val="bg2">
+                    <a:lumMod val="25000"/>
+                  </a:schemeClr>
+                </a:solidFill>
+                <a:latin typeface="Cascadia Code" panose="020B0609020000020004" pitchFamily="49" charset="0"/>
+                <a:cs typeface="Cascadia Code" panose="020B0609020000020004" pitchFamily="49" charset="0"/>
+              </a:rPr>
+              <a:t>	</a:t>
+            </a:r>
+            <a:r>
+              <a:rPr lang="en-US" sz="1600" b="1" dirty="0" err="1">
+                <a:solidFill>
+                  <a:schemeClr val="bg2">
+                    <a:lumMod val="25000"/>
+                  </a:schemeClr>
+                </a:solidFill>
+                <a:latin typeface="Cascadia Code" panose="020B0609020000020004" pitchFamily="49" charset="0"/>
+                <a:cs typeface="Cascadia Code" panose="020B0609020000020004" pitchFamily="49" charset="0"/>
+              </a:rPr>
+              <a:t>sp_ns.add</a:t>
+            </a:r>
+            <a:r>
+              <a:rPr lang="en-US" sz="1600" b="1" dirty="0">
+                <a:solidFill>
+                  <a:schemeClr val="bg2">
+                    <a:lumMod val="25000"/>
+                  </a:schemeClr>
+                </a:solidFill>
+                <a:latin typeface="Cascadia Code" panose="020B0609020000020004" pitchFamily="49" charset="0"/>
+                <a:cs typeface="Cascadia Code" panose="020B0609020000020004" pitchFamily="49" charset="0"/>
+              </a:rPr>
+              <a:t>(</a:t>
+            </a:r>
+            <a:r>
+              <a:rPr lang="en-US" sz="1600" b="1" dirty="0" err="1">
+                <a:solidFill>
+                  <a:schemeClr val="bg2">
+                    <a:lumMod val="25000"/>
+                  </a:schemeClr>
+                </a:solidFill>
+                <a:latin typeface="Cascadia Code" panose="020B0609020000020004" pitchFamily="49" charset="0"/>
+                <a:cs typeface="Cascadia Code" panose="020B0609020000020004" pitchFamily="49" charset="0"/>
+              </a:rPr>
+              <a:t>sp.i</a:t>
+            </a:r>
+            <a:r>
+              <a:rPr lang="en-US" sz="1600" b="1" dirty="0">
+                <a:solidFill>
+                  <a:schemeClr val="bg2">
+                    <a:lumMod val="25000"/>
+                  </a:schemeClr>
+                </a:solidFill>
+                <a:latin typeface="Cascadia Code" panose="020B0609020000020004" pitchFamily="49" charset="0"/>
+                <a:cs typeface="Cascadia Code" panose="020B0609020000020004" pitchFamily="49" charset="0"/>
+              </a:rPr>
+              <a:t>)</a:t>
+            </a:r>
+          </a:p>
+          <a:p>
+            <a:pPr>
+              <a:buNone/>
+            </a:pPr>
+            <a:r>
+              <a:rPr lang="en-US" sz="1600" dirty="0">
+                <a:solidFill>
+                  <a:schemeClr val="bg2">
+                    <a:lumMod val="25000"/>
+                  </a:schemeClr>
+                </a:solidFill>
+                <a:latin typeface="Cascadia Code" panose="020B0609020000020004" pitchFamily="49" charset="0"/>
+                <a:cs typeface="Cascadia Code" panose="020B0609020000020004" pitchFamily="49" charset="0"/>
+              </a:rPr>
+              <a:t>6. Repeat steps</a:t>
+            </a:r>
+            <a:r>
+              <a:rPr lang="en-US" sz="1600" b="1" dirty="0">
+                <a:solidFill>
+                  <a:schemeClr val="bg2">
+                    <a:lumMod val="25000"/>
+                  </a:schemeClr>
+                </a:solidFill>
+                <a:latin typeface="Cascadia Code" panose="020B0609020000020004" pitchFamily="49" charset="0"/>
+                <a:cs typeface="Cascadia Code" panose="020B0609020000020004" pitchFamily="49" charset="0"/>
+              </a:rPr>
+              <a:t> 3-5</a:t>
+            </a:r>
+            <a:r>
+              <a:rPr lang="en-US" sz="1600" dirty="0">
+                <a:solidFill>
+                  <a:schemeClr val="bg2">
+                    <a:lumMod val="25000"/>
+                  </a:schemeClr>
+                </a:solidFill>
+                <a:latin typeface="Cascadia Code" panose="020B0609020000020004" pitchFamily="49" charset="0"/>
+                <a:cs typeface="Cascadia Code" panose="020B0609020000020004" pitchFamily="49" charset="0"/>
+              </a:rPr>
+              <a:t> for </a:t>
+            </a:r>
+            <a:r>
+              <a:rPr lang="en-US" sz="1600" b="1" dirty="0">
+                <a:solidFill>
+                  <a:schemeClr val="bg2">
+                    <a:lumMod val="25000"/>
+                  </a:schemeClr>
+                </a:solidFill>
+                <a:latin typeface="Cascadia Code" panose="020B0609020000020004" pitchFamily="49" charset="0"/>
+                <a:cs typeface="Cascadia Code" panose="020B0609020000020004" pitchFamily="49" charset="0"/>
+              </a:rPr>
+              <a:t>n</a:t>
+            </a:r>
+            <a:r>
+              <a:rPr lang="en-US" sz="1600" dirty="0">
+                <a:solidFill>
+                  <a:schemeClr val="bg2">
+                    <a:lumMod val="25000"/>
+                  </a:schemeClr>
+                </a:solidFill>
+                <a:latin typeface="Cascadia Code" panose="020B0609020000020004" pitchFamily="49" charset="0"/>
+                <a:cs typeface="Cascadia Code" panose="020B0609020000020004" pitchFamily="49" charset="0"/>
+              </a:rPr>
+              <a:t> iterations as desired.</a:t>
+            </a:r>
+            <a:endParaRPr lang="en-US" sz="1600" b="1" dirty="0">
+              <a:solidFill>
+                <a:schemeClr val="bg2">
+                  <a:lumMod val="25000"/>
+                </a:schemeClr>
+              </a:solidFill>
+              <a:latin typeface="Cascadia Code" panose="020B0609020000020004" pitchFamily="49" charset="0"/>
+              <a:cs typeface="Cascadia Code" panose="020B0609020000020004" pitchFamily="49" charset="0"/>
+            </a:endParaRPr>
+          </a:p>
+        </p:txBody>
+      </p:sp>
+      <p:pic>
+        <p:nvPicPr>
+          <p:cNvPr id="7" name="Picture 6">
+            <a:extLst>
+              <a:ext uri="{FF2B5EF4-FFF2-40B4-BE49-F238E27FC236}">
+                <a16:creationId xmlns:a16="http://schemas.microsoft.com/office/drawing/2014/main" id="{1B782E07-7306-1DEC-0621-0C982AF30BB5}"/>
+              </a:ext>
+            </a:extLst>
+          </p:cNvPr>
+          <p:cNvPicPr>
+            <a:picLocks noChangeAspect="1"/>
+          </p:cNvPicPr>
+          <p:nvPr/>
+        </p:nvPicPr>
+        <p:blipFill>
+          <a:blip r:embed="rId2"/>
+          <a:stretch>
+            <a:fillRect/>
+          </a:stretch>
+        </p:blipFill>
+        <p:spPr>
+          <a:xfrm>
+            <a:off x="1311274" y="2590800"/>
+            <a:ext cx="5349570" cy="2514600"/>
+          </a:xfrm>
+          <a:prstGeom prst="rect">
+            <a:avLst/>
+          </a:prstGeom>
+        </p:spPr>
+      </p:pic>
+      <p:pic>
+        <p:nvPicPr>
+          <p:cNvPr id="9" name="Picture 8">
+            <a:extLst>
+              <a:ext uri="{FF2B5EF4-FFF2-40B4-BE49-F238E27FC236}">
+                <a16:creationId xmlns:a16="http://schemas.microsoft.com/office/drawing/2014/main" id="{B42A3974-5EB2-D0F7-5A9C-4E0C45228A30}"/>
+              </a:ext>
+            </a:extLst>
+          </p:cNvPr>
+          <p:cNvPicPr>
+            <a:picLocks noChangeAspect="1"/>
+          </p:cNvPicPr>
+          <p:nvPr/>
+        </p:nvPicPr>
+        <p:blipFill>
+          <a:blip r:embed="rId3"/>
+          <a:stretch>
+            <a:fillRect/>
+          </a:stretch>
+        </p:blipFill>
+        <p:spPr>
+          <a:xfrm>
+            <a:off x="2095777" y="5310941"/>
+            <a:ext cx="3780564" cy="1036717"/>
+          </a:xfrm>
+          <a:prstGeom prst="rect">
+            <a:avLst/>
+          </a:prstGeom>
+        </p:spPr>
+      </p:pic>
+    </p:spTree>
+    <p:extLst>
+      <p:ext uri="{BB962C8B-B14F-4D97-AF65-F5344CB8AC3E}">
+        <p14:creationId xmlns:p14="http://schemas.microsoft.com/office/powerpoint/2010/main" val="4099957508"/>
+      </p:ext>
+    </p:extLst>
+  </p:cSld>
+  <p:clrMapOvr>
+    <a:masterClrMapping/>
+  </p:clrMapOvr>
+</p:sld>
+</file>
+
+<file path=ppt/slides/slide16.xml><?xml version="1.0" encoding="utf-8"?>
+<p:sld xmlns:a="http://schemas.openxmlformats.org/drawingml/2006/main" xmlns:r="http://schemas.openxmlformats.org/officeDocument/2006/relationships" xmlns:p="http://schemas.openxmlformats.org/presentationml/2006/main">
+  <p:cSld>
+    <p:spTree>
+      <p:nvGrpSpPr>
+        <p:cNvPr id="1" name="">
+          <a:extLst>
+            <a:ext uri="{FF2B5EF4-FFF2-40B4-BE49-F238E27FC236}">
+              <a16:creationId xmlns:a16="http://schemas.microsoft.com/office/drawing/2014/main" id="{0B270692-A41A-9F1C-DAEA-DF1CE56CC2DC}"/>
+            </a:ext>
+          </a:extLst>
+        </p:cNvPr>
+        <p:cNvGrpSpPr/>
+        <p:nvPr/>
+      </p:nvGrpSpPr>
+      <p:grpSpPr>
+        <a:xfrm>
+          <a:off x="0" y="0"/>
+          <a:ext cx="0" cy="0"/>
+          <a:chOff x="0" y="0"/>
+          <a:chExt cx="0" cy="0"/>
+        </a:xfrm>
+      </p:grpSpPr>
+      <p:pic>
+        <p:nvPicPr>
+          <p:cNvPr id="3" name="Picture 2">
+            <a:extLst>
+              <a:ext uri="{FF2B5EF4-FFF2-40B4-BE49-F238E27FC236}">
+                <a16:creationId xmlns:a16="http://schemas.microsoft.com/office/drawing/2014/main" id="{E29BC948-B24A-8A8E-9FB1-205A966EF3F4}"/>
+              </a:ext>
+            </a:extLst>
+          </p:cNvPr>
+          <p:cNvPicPr>
+            <a:picLocks noChangeAspect="1"/>
+          </p:cNvPicPr>
+          <p:nvPr/>
+        </p:nvPicPr>
+        <p:blipFill>
+          <a:blip r:embed="rId2"/>
+          <a:stretch>
+            <a:fillRect/>
+          </a:stretch>
+        </p:blipFill>
+        <p:spPr>
+          <a:xfrm>
+            <a:off x="3474671" y="866417"/>
+            <a:ext cx="5239481" cy="5125165"/>
+          </a:xfrm>
+          <a:prstGeom prst="rect">
+            <a:avLst/>
+          </a:prstGeom>
+          <a:ln w="38100">
+            <a:solidFill>
+              <a:schemeClr val="accent1"/>
+            </a:solidFill>
+          </a:ln>
+        </p:spPr>
+      </p:pic>
+    </p:spTree>
+    <p:extLst>
+      <p:ext uri="{BB962C8B-B14F-4D97-AF65-F5344CB8AC3E}">
+        <p14:creationId xmlns:p14="http://schemas.microsoft.com/office/powerpoint/2010/main" val="880601466"/>
+      </p:ext>
+    </p:extLst>
+  </p:cSld>
+  <p:clrMapOvr>
+    <a:masterClrMapping/>
+  </p:clrMapOvr>
+</p:sld>
+</file>
+
+<file path=ppt/slides/slide17.xml><?xml version="1.0" encoding="utf-8"?>
 <p:sld xmlns:a="http://schemas.openxmlformats.org/drawingml/2006/main" xmlns:r="http://schemas.openxmlformats.org/officeDocument/2006/relationships" xmlns:p="http://schemas.openxmlformats.org/presentationml/2006/main">
   <p:cSld>
     <p:spTree>
@@ -16552,7 +17994,7 @@
 </p:sld>
 </file>
 
-<file path=ppt/slides/slide15.xml><?xml version="1.0" encoding="utf-8"?>
+<file path=ppt/slides/slide18.xml><?xml version="1.0" encoding="utf-8"?>
 <p:sld xmlns:a="http://schemas.openxmlformats.org/drawingml/2006/main" xmlns:r="http://schemas.openxmlformats.org/officeDocument/2006/relationships" xmlns:p="http://schemas.openxmlformats.org/presentationml/2006/main">
   <p:cSld>
     <p:spTree>
@@ -16629,7 +18071,7 @@
 </p:sld>
 </file>
 
-<file path=ppt/slides/slide16.xml><?xml version="1.0" encoding="utf-8"?>
+<file path=ppt/slides/slide19.xml><?xml version="1.0" encoding="utf-8"?>
 <p:sld xmlns:a="http://schemas.openxmlformats.org/drawingml/2006/main" xmlns:r="http://schemas.openxmlformats.org/officeDocument/2006/relationships" xmlns:p="http://schemas.openxmlformats.org/presentationml/2006/main">
   <p:cSld>
     <p:spTree>
@@ -16883,7 +18325,136 @@
 </p:sld>
 </file>
 
-<file path=ppt/slides/slide17.xml><?xml version="1.0" encoding="utf-8"?>
+<file path=ppt/slides/slide2.xml><?xml version="1.0" encoding="utf-8"?>
+<p:sld xmlns:a="http://schemas.openxmlformats.org/drawingml/2006/main" xmlns:r="http://schemas.openxmlformats.org/officeDocument/2006/relationships" xmlns:p="http://schemas.openxmlformats.org/presentationml/2006/main">
+  <p:cSld>
+    <p:bg>
+      <p:bgPr>
+        <a:solidFill>
+          <a:schemeClr val="bg1"/>
+        </a:solidFill>
+        <a:effectLst/>
+      </p:bgPr>
+    </p:bg>
+    <p:spTree>
+      <p:nvGrpSpPr>
+        <p:cNvPr id="1" name=""/>
+        <p:cNvGrpSpPr/>
+        <p:nvPr/>
+      </p:nvGrpSpPr>
+      <p:grpSpPr>
+        <a:xfrm>
+          <a:off x="0" y="0"/>
+          <a:ext cx="0" cy="0"/>
+          <a:chOff x="0" y="0"/>
+          <a:chExt cx="0" cy="0"/>
+        </a:xfrm>
+      </p:grpSpPr>
+      <p:sp>
+        <p:nvSpPr>
+          <p:cNvPr id="6" name="Title 5">
+            <a:extLst>
+              <a:ext uri="{FF2B5EF4-FFF2-40B4-BE49-F238E27FC236}">
+                <a16:creationId xmlns:a16="http://schemas.microsoft.com/office/drawing/2014/main" id="{D8B68A17-565E-5F07-D76E-981C2E327304}"/>
+              </a:ext>
+            </a:extLst>
+          </p:cNvPr>
+          <p:cNvSpPr>
+            <a:spLocks noGrp="1"/>
+          </p:cNvSpPr>
+          <p:nvPr>
+            <p:ph type="title"/>
+          </p:nvPr>
+        </p:nvSpPr>
+        <p:spPr>
+          <a:xfrm>
+            <a:off x="989012" y="723900"/>
+            <a:ext cx="4114800" cy="5295900"/>
+          </a:xfrm>
+        </p:spPr>
+        <p:txBody>
+          <a:bodyPr>
+            <a:normAutofit/>
+          </a:bodyPr>
+          <a:lstStyle/>
+          <a:p>
+            <a:r>
+              <a:rPr lang="en-US" sz="3200" dirty="0">
+                <a:solidFill>
+                  <a:schemeClr val="bg2">
+                    <a:lumMod val="25000"/>
+                  </a:schemeClr>
+                </a:solidFill>
+                <a:latin typeface="Cascadia Code SemiBold" panose="020B0609020000020004" pitchFamily="49" charset="0"/>
+                <a:cs typeface="Cascadia Code SemiBold" panose="020B0609020000020004" pitchFamily="49" charset="0"/>
+              </a:rPr>
+              <a:t>Project Abstract</a:t>
+            </a:r>
+          </a:p>
+        </p:txBody>
+      </p:sp>
+      <p:sp>
+        <p:nvSpPr>
+          <p:cNvPr id="3" name="Content Placeholder 2">
+            <a:extLst>
+              <a:ext uri="{FF2B5EF4-FFF2-40B4-BE49-F238E27FC236}">
+                <a16:creationId xmlns:a16="http://schemas.microsoft.com/office/drawing/2014/main" id="{22788C46-D0BC-4307-AE55-7601A139E7CB}"/>
+              </a:ext>
+            </a:extLst>
+          </p:cNvPr>
+          <p:cNvSpPr>
+            <a:spLocks noGrp="1"/>
+          </p:cNvSpPr>
+          <p:nvPr>
+            <p:ph idx="1"/>
+          </p:nvPr>
+        </p:nvSpPr>
+        <p:spPr>
+          <a:xfrm>
+            <a:off x="7008812" y="1314450"/>
+            <a:ext cx="4114800" cy="4114800"/>
+          </a:xfrm>
+        </p:spPr>
+        <p:txBody>
+          <a:bodyPr vert="horz" lIns="91416" tIns="45708" rIns="91416" bIns="45708" rtlCol="0" anchor="ctr">
+            <a:noAutofit/>
+          </a:bodyPr>
+          <a:lstStyle/>
+          <a:p>
+            <a:pPr>
+              <a:lnSpc>
+                <a:spcPct val="150000"/>
+              </a:lnSpc>
+            </a:pPr>
+            <a:r>
+              <a:rPr lang="en-US" sz="1800" dirty="0">
+                <a:solidFill>
+                  <a:schemeClr val="bg2">
+                    <a:lumMod val="25000"/>
+                  </a:schemeClr>
+                </a:solidFill>
+                <a:latin typeface="Cascadia Code" panose="020B0609020000020004" pitchFamily="49" charset="0"/>
+                <a:cs typeface="Cascadia Code" panose="020B0609020000020004" pitchFamily="49" charset="0"/>
+              </a:rPr>
+              <a:t>This project reimplements the 2017 "Universal Skin Detection Without Color" method to detect skin in grayscale images. It uses face detection, local texture features (LBP, lacunarity), and grayscale statistics to adaptively segment skin. Hyperparameters were tuned for better segmentation performance.</a:t>
+            </a:r>
+          </a:p>
+        </p:txBody>
+      </p:sp>
+    </p:spTree>
+    <p:extLst>
+      <p:ext uri="{BB962C8B-B14F-4D97-AF65-F5344CB8AC3E}">
+        <p14:creationId xmlns:p14="http://schemas.microsoft.com/office/powerpoint/2010/main" val="1325608595"/>
+      </p:ext>
+    </p:extLst>
+  </p:cSld>
+  <p:clrMapOvr>
+    <a:masterClrMapping/>
+  </p:clrMapOvr>
+</p:sld>
+</file>
+
+<file path=ppt/slides/slide20.xml><?xml version="1.0" encoding="utf-8"?>
 <p:sld xmlns:a="http://schemas.openxmlformats.org/drawingml/2006/main" xmlns:r="http://schemas.openxmlformats.org/officeDocument/2006/relationships" xmlns:p="http://schemas.openxmlformats.org/presentationml/2006/main">
   <p:cSld>
     <p:spTree>
@@ -17095,7 +18666,7 @@
 </p:sld>
 </file>
 
-<file path=ppt/slides/slide18.xml><?xml version="1.0" encoding="utf-8"?>
+<file path=ppt/slides/slide21.xml><?xml version="1.0" encoding="utf-8"?>
 <p:sld xmlns:a="http://schemas.openxmlformats.org/drawingml/2006/main" xmlns:r="http://schemas.openxmlformats.org/officeDocument/2006/relationships" xmlns:p="http://schemas.openxmlformats.org/presentationml/2006/main">
   <p:cSld>
     <p:spTree>
@@ -17172,7 +18743,7 @@
 </p:sld>
 </file>
 
-<file path=ppt/slides/slide19.xml><?xml version="1.0" encoding="utf-8"?>
+<file path=ppt/slides/slide22.xml><?xml version="1.0" encoding="utf-8"?>
 <p:sld xmlns:a="http://schemas.openxmlformats.org/drawingml/2006/main" xmlns:r="http://schemas.openxmlformats.org/officeDocument/2006/relationships" xmlns:p="http://schemas.openxmlformats.org/presentationml/2006/main">
   <p:cSld>
     <p:spTree>
@@ -17248,136 +18819,7 @@
 </p:sld>
 </file>
 
-<file path=ppt/slides/slide2.xml><?xml version="1.0" encoding="utf-8"?>
-<p:sld xmlns:a="http://schemas.openxmlformats.org/drawingml/2006/main" xmlns:r="http://schemas.openxmlformats.org/officeDocument/2006/relationships" xmlns:p="http://schemas.openxmlformats.org/presentationml/2006/main">
-  <p:cSld>
-    <p:bg>
-      <p:bgPr>
-        <a:solidFill>
-          <a:schemeClr val="bg1"/>
-        </a:solidFill>
-        <a:effectLst/>
-      </p:bgPr>
-    </p:bg>
-    <p:spTree>
-      <p:nvGrpSpPr>
-        <p:cNvPr id="1" name=""/>
-        <p:cNvGrpSpPr/>
-        <p:nvPr/>
-      </p:nvGrpSpPr>
-      <p:grpSpPr>
-        <a:xfrm>
-          <a:off x="0" y="0"/>
-          <a:ext cx="0" cy="0"/>
-          <a:chOff x="0" y="0"/>
-          <a:chExt cx="0" cy="0"/>
-        </a:xfrm>
-      </p:grpSpPr>
-      <p:sp>
-        <p:nvSpPr>
-          <p:cNvPr id="6" name="Title 5">
-            <a:extLst>
-              <a:ext uri="{FF2B5EF4-FFF2-40B4-BE49-F238E27FC236}">
-                <a16:creationId xmlns:a16="http://schemas.microsoft.com/office/drawing/2014/main" id="{D8B68A17-565E-5F07-D76E-981C2E327304}"/>
-              </a:ext>
-            </a:extLst>
-          </p:cNvPr>
-          <p:cNvSpPr>
-            <a:spLocks noGrp="1"/>
-          </p:cNvSpPr>
-          <p:nvPr>
-            <p:ph type="title"/>
-          </p:nvPr>
-        </p:nvSpPr>
-        <p:spPr>
-          <a:xfrm>
-            <a:off x="989012" y="723900"/>
-            <a:ext cx="4114800" cy="5295900"/>
-          </a:xfrm>
-        </p:spPr>
-        <p:txBody>
-          <a:bodyPr>
-            <a:normAutofit/>
-          </a:bodyPr>
-          <a:lstStyle/>
-          <a:p>
-            <a:r>
-              <a:rPr lang="en-US" sz="3200" dirty="0">
-                <a:solidFill>
-                  <a:schemeClr val="bg2">
-                    <a:lumMod val="25000"/>
-                  </a:schemeClr>
-                </a:solidFill>
-                <a:latin typeface="Cascadia Code SemiBold" panose="020B0609020000020004" pitchFamily="49" charset="0"/>
-                <a:cs typeface="Cascadia Code SemiBold" panose="020B0609020000020004" pitchFamily="49" charset="0"/>
-              </a:rPr>
-              <a:t>Project Abstract</a:t>
-            </a:r>
-          </a:p>
-        </p:txBody>
-      </p:sp>
-      <p:sp>
-        <p:nvSpPr>
-          <p:cNvPr id="3" name="Content Placeholder 2">
-            <a:extLst>
-              <a:ext uri="{FF2B5EF4-FFF2-40B4-BE49-F238E27FC236}">
-                <a16:creationId xmlns:a16="http://schemas.microsoft.com/office/drawing/2014/main" id="{22788C46-D0BC-4307-AE55-7601A139E7CB}"/>
-              </a:ext>
-            </a:extLst>
-          </p:cNvPr>
-          <p:cNvSpPr>
-            <a:spLocks noGrp="1"/>
-          </p:cNvSpPr>
-          <p:nvPr>
-            <p:ph idx="1"/>
-          </p:nvPr>
-        </p:nvSpPr>
-        <p:spPr>
-          <a:xfrm>
-            <a:off x="7008812" y="1314450"/>
-            <a:ext cx="4114800" cy="4114800"/>
-          </a:xfrm>
-        </p:spPr>
-        <p:txBody>
-          <a:bodyPr vert="horz" lIns="91416" tIns="45708" rIns="91416" bIns="45708" rtlCol="0" anchor="ctr">
-            <a:noAutofit/>
-          </a:bodyPr>
-          <a:lstStyle/>
-          <a:p>
-            <a:pPr>
-              <a:lnSpc>
-                <a:spcPct val="150000"/>
-              </a:lnSpc>
-            </a:pPr>
-            <a:r>
-              <a:rPr lang="en-US" sz="1800" dirty="0">
-                <a:solidFill>
-                  <a:schemeClr val="bg2">
-                    <a:lumMod val="25000"/>
-                  </a:schemeClr>
-                </a:solidFill>
-                <a:latin typeface="Cascadia Code" panose="020B0609020000020004" pitchFamily="49" charset="0"/>
-                <a:cs typeface="Cascadia Code" panose="020B0609020000020004" pitchFamily="49" charset="0"/>
-              </a:rPr>
-              <a:t>This project reimplements the 2017 "Universal Skin Detection Without Color" method to detect skin in grayscale images. It uses face detection, local texture features (LBP, lacunarity), and grayscale statistics to adaptively segment skin. Hyperparameters were tuned for better segmentation performance.</a:t>
-            </a:r>
-          </a:p>
-        </p:txBody>
-      </p:sp>
-    </p:spTree>
-    <p:extLst>
-      <p:ext uri="{BB962C8B-B14F-4D97-AF65-F5344CB8AC3E}">
-        <p14:creationId xmlns:p14="http://schemas.microsoft.com/office/powerpoint/2010/main" val="1325608595"/>
-      </p:ext>
-    </p:extLst>
-  </p:cSld>
-  <p:clrMapOvr>
-    <a:masterClrMapping/>
-  </p:clrMapOvr>
-</p:sld>
-</file>
-
-<file path=ppt/slides/slide20.xml><?xml version="1.0" encoding="utf-8"?>
+<file path=ppt/slides/slide23.xml><?xml version="1.0" encoding="utf-8"?>
 <p:sld xmlns:a="http://schemas.openxmlformats.org/drawingml/2006/main" xmlns:r="http://schemas.openxmlformats.org/officeDocument/2006/relationships" xmlns:p="http://schemas.openxmlformats.org/presentationml/2006/main">
   <p:cSld>
     <p:spTree>
@@ -17453,7 +18895,7 @@
 </p:sld>
 </file>
 
-<file path=ppt/slides/slide21.xml><?xml version="1.0" encoding="utf-8"?>
+<file path=ppt/slides/slide24.xml><?xml version="1.0" encoding="utf-8"?>
 <p:sld xmlns:a="http://schemas.openxmlformats.org/drawingml/2006/main" xmlns:r="http://schemas.openxmlformats.org/officeDocument/2006/relationships" xmlns:p="http://schemas.openxmlformats.org/presentationml/2006/main">
   <p:cSld>
     <p:spTree>
@@ -20993,6 +22435,15 @@
 </file>
 
 <file path=customXml/item1.xml><?xml version="1.0" encoding="utf-8"?>
+<?mso-contentType ?>
+<FormTemplates xmlns="http://schemas.microsoft.com/sharepoint/v3/contenttype/forms">
+  <Display>DocumentLibraryForm</Display>
+  <Edit>DocumentLibraryForm</Edit>
+  <New>DocumentLibraryForm</New>
+</FormTemplates>
+</file>
+
+<file path=customXml/item2.xml><?xml version="1.0" encoding="utf-8"?>
 <ct:contentTypeSchema xmlns:ct="http://schemas.microsoft.com/office/2006/metadata/contentType" xmlns:ma="http://schemas.microsoft.com/office/2006/metadata/properties/metaAttributes" ct:_="" ma:_="" ma:contentTypeName="Document" ma:contentTypeID="0x01010079F111ED35F8CC479449609E8A0923A6" ma:contentTypeVersion="28" ma:contentTypeDescription="Create a new document." ma:contentTypeScope="" ma:versionID="60f5a4f2d2b0abadcf532d48ebf9cb71">
   <xsd:schema xmlns:xsd="http://www.w3.org/2001/XMLSchema" xmlns:xs="http://www.w3.org/2001/XMLSchema" xmlns:p="http://schemas.microsoft.com/office/2006/metadata/properties" xmlns:ns1="http://schemas.microsoft.com/sharepoint/v3" xmlns:ns2="71af3243-3dd4-4a8d-8c0d-dd76da1f02a5" xmlns:ns3="16c05727-aa75-4e4a-9b5f-8a80a1165891" xmlns:ns4="230e9df3-be65-4c73-a93b-d1236ebd677e" targetNamespace="http://schemas.microsoft.com/office/2006/metadata/properties" ma:root="true" ma:fieldsID="7dd78129e6a1811f84807ad11c651531" ns1:_="" ns2:_="" ns3:_="" ns4:_="">
     <xsd:import namespace="http://schemas.microsoft.com/sharepoint/v3"/>
@@ -21304,15 +22755,6 @@
 </ct:contentTypeSchema>
 </file>
 
-<file path=customXml/item2.xml><?xml version="1.0" encoding="utf-8"?>
-<?mso-contentType ?>
-<FormTemplates xmlns="http://schemas.microsoft.com/sharepoint/v3/contenttype/forms">
-  <Display>DocumentLibraryForm</Display>
-  <Edit>DocumentLibraryForm</Edit>
-  <New>DocumentLibraryForm</New>
-</FormTemplates>
-</file>
-
 <file path=customXml/item3.xml><?xml version="1.0" encoding="utf-8"?>
 <p:properties xmlns:p="http://schemas.microsoft.com/office/2006/metadata/properties" xmlns:xsi="http://www.w3.org/2001/XMLSchema-instance" xmlns:pc="http://schemas.microsoft.com/office/infopath/2007/PartnerControls">
   <documentManagement>
@@ -21334,6 +22776,14 @@
 </file>
 
 <file path=customXml/itemProps1.xml><?xml version="1.0" encoding="utf-8"?>
+<ds:datastoreItem xmlns:ds="http://schemas.openxmlformats.org/officeDocument/2006/customXml" ds:itemID="{4C37B52A-9EC8-4B7A-85C4-31F7EAFE403D}">
+  <ds:schemaRefs>
+    <ds:schemaRef ds:uri="http://schemas.microsoft.com/sharepoint/v3/contenttype/forms"/>
+  </ds:schemaRefs>
+</ds:datastoreItem>
+</file>
+
+<file path=customXml/itemProps2.xml><?xml version="1.0" encoding="utf-8"?>
 <ds:datastoreItem xmlns:ds="http://schemas.openxmlformats.org/officeDocument/2006/customXml" ds:itemID="{20C06458-EC9A-428C-9123-A760B9587A60}">
   <ds:schemaRefs>
     <ds:schemaRef ds:uri="http://schemas.microsoft.com/office/2006/metadata/contentType"/>
@@ -21350,14 +22800,6 @@
     <ds:schemaRef ds:uri="http://purl.org/dc/elements/1.1/"/>
     <ds:schemaRef ds:uri="http://purl.org/dc/terms/"/>
     <ds:schemaRef ds:uri="http://schemas.microsoft.com/internal/obd"/>
-  </ds:schemaRefs>
-</ds:datastoreItem>
-</file>
-
-<file path=customXml/itemProps2.xml><?xml version="1.0" encoding="utf-8"?>
-<ds:datastoreItem xmlns:ds="http://schemas.openxmlformats.org/officeDocument/2006/customXml" ds:itemID="{4C37B52A-9EC8-4B7A-85C4-31F7EAFE403D}">
-  <ds:schemaRefs>
-    <ds:schemaRef ds:uri="http://schemas.microsoft.com/sharepoint/v3/contenttype/forms"/>
   </ds:schemaRefs>
 </ds:datastoreItem>
 </file>

</xml_diff>